<commit_message>
reconstruct directories and init finish
</commit_message>
<xml_diff>
--- a/slide/data stream mining.pptx
+++ b/slide/data stream mining.pptx
@@ -118,7 +118,7 @@
   </p:defaultTextStyle>
   <p:extLst>
     <p:ext uri="{EFAFB233-063F-42B5-8137-9DF3F51BA10A}">
-      <p15:sldGuideLst xmlns="" xmlns:p15="http://schemas.microsoft.com/office/powerpoint/2012/main"/>
+      <p15:sldGuideLst xmlns:p15="http://schemas.microsoft.com/office/powerpoint/2012/main" xmlns=""/>
     </p:ext>
   </p:extLst>
 </p:presentation>
@@ -267,7 +267,7 @@
           <a:p>
             <a:fld id="{F77B2EB1-EA88-4503-95EA-93923E5BA59E}" type="datetimeFigureOut">
               <a:rPr lang="en-US" smtClean="0"/>
-              <a:t>3/9/2013</a:t>
+              <a:t>3/12/2013</a:t>
             </a:fld>
             <a:endParaRPr lang="en-US"/>
           </a:p>
@@ -626,7 +626,7 @@
           <a:p>
             <a:fld id="{F77B2EB1-EA88-4503-95EA-93923E5BA59E}" type="datetimeFigureOut">
               <a:rPr lang="en-US" smtClean="0"/>
-              <a:t>3/9/2013</a:t>
+              <a:t>3/12/2013</a:t>
             </a:fld>
             <a:endParaRPr lang="en-US"/>
           </a:p>
@@ -801,7 +801,7 @@
           <a:p>
             <a:fld id="{F77B2EB1-EA88-4503-95EA-93923E5BA59E}" type="datetimeFigureOut">
               <a:rPr lang="en-US" smtClean="0"/>
-              <a:t>3/9/2013</a:t>
+              <a:t>3/12/2013</a:t>
             </a:fld>
             <a:endParaRPr lang="en-US"/>
           </a:p>
@@ -1036,7 +1036,7 @@
           <a:p>
             <a:fld id="{F77B2EB1-EA88-4503-95EA-93923E5BA59E}" type="datetimeFigureOut">
               <a:rPr lang="en-US" smtClean="0"/>
-              <a:t>3/9/2013</a:t>
+              <a:t>3/12/2013</a:t>
             </a:fld>
             <a:endParaRPr lang="en-US"/>
           </a:p>
@@ -1305,7 +1305,7 @@
           <a:p>
             <a:fld id="{F77B2EB1-EA88-4503-95EA-93923E5BA59E}" type="datetimeFigureOut">
               <a:rPr lang="en-US" smtClean="0"/>
-              <a:t>3/9/2013</a:t>
+              <a:t>3/12/2013</a:t>
             </a:fld>
             <a:endParaRPr lang="en-US"/>
           </a:p>
@@ -1525,7 +1525,7 @@
           <a:p>
             <a:fld id="{F77B2EB1-EA88-4503-95EA-93923E5BA59E}" type="datetimeFigureOut">
               <a:rPr lang="en-US" smtClean="0"/>
-              <a:t>3/9/2013</a:t>
+              <a:t>3/12/2013</a:t>
             </a:fld>
             <a:endParaRPr lang="en-US"/>
           </a:p>
@@ -1877,7 +1877,7 @@
           <a:p>
             <a:fld id="{F77B2EB1-EA88-4503-95EA-93923E5BA59E}" type="datetimeFigureOut">
               <a:rPr lang="en-US" smtClean="0"/>
-              <a:t>3/9/2013</a:t>
+              <a:t>3/12/2013</a:t>
             </a:fld>
             <a:endParaRPr lang="en-US"/>
           </a:p>
@@ -2109,7 +2109,7 @@
           <a:p>
             <a:fld id="{F77B2EB1-EA88-4503-95EA-93923E5BA59E}" type="datetimeFigureOut">
               <a:rPr lang="en-US" smtClean="0"/>
-              <a:t>3/9/2013</a:t>
+              <a:t>3/12/2013</a:t>
             </a:fld>
             <a:endParaRPr lang="en-US"/>
           </a:p>
@@ -2249,7 +2249,7 @@
           <a:p>
             <a:fld id="{F77B2EB1-EA88-4503-95EA-93923E5BA59E}" type="datetimeFigureOut">
               <a:rPr lang="en-US" smtClean="0"/>
-              <a:t>3/9/2013</a:t>
+              <a:t>3/12/2013</a:t>
             </a:fld>
             <a:endParaRPr lang="en-US"/>
           </a:p>
@@ -2526,7 +2526,7 @@
           <a:p>
             <a:fld id="{F77B2EB1-EA88-4503-95EA-93923E5BA59E}" type="datetimeFigureOut">
               <a:rPr lang="en-US" smtClean="0"/>
-              <a:t>3/9/2013</a:t>
+              <a:t>3/12/2013</a:t>
             </a:fld>
             <a:endParaRPr lang="en-US"/>
           </a:p>
@@ -2933,7 +2933,7 @@
           <a:p>
             <a:fld id="{F77B2EB1-EA88-4503-95EA-93923E5BA59E}" type="datetimeFigureOut">
               <a:rPr lang="en-US" smtClean="0"/>
-              <a:t>3/9/2013</a:t>
+              <a:t>3/12/2013</a:t>
             </a:fld>
             <a:endParaRPr lang="en-US"/>
           </a:p>
@@ -3271,7 +3271,7 @@
           <a:p>
             <a:fld id="{F77B2EB1-EA88-4503-95EA-93923E5BA59E}" type="datetimeFigureOut">
               <a:rPr lang="en-US" smtClean="0"/>
-              <a:t>3/9/2013</a:t>
+              <a:t>3/12/2013</a:t>
             </a:fld>
             <a:endParaRPr lang="en-US"/>
           </a:p>
@@ -3849,8 +3849,12 @@
           </a:p>
           <a:p>
             <a:r>
-              <a:rPr lang="en-US" dirty="0" err="1" smtClean="0"/>
-              <a:t>Email:zixiaojindao@gmail.com</a:t>
+              <a:rPr lang="en-US" dirty="0" smtClean="0"/>
+              <a:t>Email</a:t>
+            </a:r>
+            <a:r>
+              <a:rPr lang="en-US" dirty="0" smtClean="0"/>
+              <a:t>: zixiaojindao@gmail.com</a:t>
             </a:r>
             <a:endParaRPr lang="en-US" dirty="0"/>
           </a:p>

</xml_diff>